<commit_message>
Added AUT logo file
</commit_message>
<xml_diff>
--- a/inst/rmarkdown/templates/autbeamer/skeleton/bgImages/dct/cover-sample-calibri-16x9.pptx
+++ b/inst/rmarkdown/templates/autbeamer/skeleton/bgImages/dct/cover-sample-calibri-16x9.pptx
@@ -113,14 +113,6 @@
     </p:ext>
   </p:extLst>
 </p:presentation>
-</file>
-
-<file path=ppt/revisionInfo.xml><?xml version="1.0" encoding="utf-8"?>
-<p1510:revInfo xmlns:a="http://schemas.openxmlformats.org/drawingml/2006/main" xmlns:r="http://schemas.openxmlformats.org/officeDocument/2006/relationships" xmlns:p1510="http://schemas.microsoft.com/office/powerpoint/2015/10/main">
-  <p1510:revLst>
-    <p1510:client id="{D35F0766-957D-D44A-AA1D-77FD00D9AF38}" v="5" dt="2023-02-08T01:12:06.364"/>
-  </p1510:revLst>
-</p1510:revInfo>
 </file>
 
 <file path=ppt/changesInfos/changesInfo1.xml><?xml version="1.0" encoding="utf-8"?>
@@ -294,6 +286,54 @@
       </pc:sldMasterChg>
     </pc:docChg>
   </pc:docChgLst>
+  <pc:docChgLst>
+    <pc:chgData name="Sarah Marshall" userId="df263cc2-7e49-4b75-868c-7783aebd9e8b" providerId="ADAL" clId="{06DAFC0D-52FC-4ACF-81AA-04CFA93C53ED}"/>
+    <pc:docChg chg="custSel modSld">
+      <pc:chgData name="Sarah Marshall" userId="df263cc2-7e49-4b75-868c-7783aebd9e8b" providerId="ADAL" clId="{06DAFC0D-52FC-4ACF-81AA-04CFA93C53ED}" dt="2023-03-07T20:54:40.663" v="17" actId="478"/>
+      <pc:docMkLst>
+        <pc:docMk/>
+      </pc:docMkLst>
+      <pc:sldChg chg="addSp delSp modSp mod">
+        <pc:chgData name="Sarah Marshall" userId="df263cc2-7e49-4b75-868c-7783aebd9e8b" providerId="ADAL" clId="{06DAFC0D-52FC-4ACF-81AA-04CFA93C53ED}" dt="2023-03-07T20:54:40.663" v="17" actId="478"/>
+        <pc:sldMkLst>
+          <pc:docMk/>
+          <pc:sldMk cId="1267446271" sldId="301"/>
+        </pc:sldMkLst>
+        <pc:spChg chg="add del mod">
+          <ac:chgData name="Sarah Marshall" userId="df263cc2-7e49-4b75-868c-7783aebd9e8b" providerId="ADAL" clId="{06DAFC0D-52FC-4ACF-81AA-04CFA93C53ED}" dt="2023-03-07T20:54:40.663" v="17" actId="478"/>
+          <ac:spMkLst>
+            <pc:docMk/>
+            <pc:sldMk cId="1267446271" sldId="301"/>
+            <ac:spMk id="2" creationId="{E0AAD0FF-C82C-4B4D-16CF-342035EA73E8}"/>
+          </ac:spMkLst>
+        </pc:spChg>
+        <pc:spChg chg="add del mod">
+          <ac:chgData name="Sarah Marshall" userId="df263cc2-7e49-4b75-868c-7783aebd9e8b" providerId="ADAL" clId="{06DAFC0D-52FC-4ACF-81AA-04CFA93C53ED}" dt="2023-03-07T20:54:39.053" v="16" actId="478"/>
+          <ac:spMkLst>
+            <pc:docMk/>
+            <pc:sldMk cId="1267446271" sldId="301"/>
+            <ac:spMk id="3" creationId="{DF2E7365-2EA9-C92F-35F0-3BC087A45347}"/>
+          </ac:spMkLst>
+        </pc:spChg>
+        <pc:spChg chg="add del mod">
+          <ac:chgData name="Sarah Marshall" userId="df263cc2-7e49-4b75-868c-7783aebd9e8b" providerId="ADAL" clId="{06DAFC0D-52FC-4ACF-81AA-04CFA93C53ED}" dt="2023-03-07T20:54:37.596" v="14" actId="478"/>
+          <ac:spMkLst>
+            <pc:docMk/>
+            <pc:sldMk cId="1267446271" sldId="301"/>
+            <ac:spMk id="5" creationId="{379A780D-B0F8-DC3C-14AD-88595D020D50}"/>
+          </ac:spMkLst>
+        </pc:spChg>
+        <pc:spChg chg="add del">
+          <ac:chgData name="Sarah Marshall" userId="df263cc2-7e49-4b75-868c-7783aebd9e8b" providerId="ADAL" clId="{06DAFC0D-52FC-4ACF-81AA-04CFA93C53ED}" dt="2023-03-07T20:54:38.470" v="15" actId="478"/>
+          <ac:spMkLst>
+            <pc:docMk/>
+            <pc:sldMk cId="1267446271" sldId="301"/>
+            <ac:spMk id="6" creationId="{80174C6E-71B0-97E4-FD73-AF1E1FF93E8E}"/>
+          </ac:spMkLst>
+        </pc:spChg>
+      </pc:sldChg>
+    </pc:docChg>
+  </pc:docChgLst>
 </pc:chgInfo>
 </file>
 
@@ -379,7 +419,7 @@
           <a:p>
             <a:fld id="{181B8C58-07EF-404D-B457-37886CF22D71}" type="datetimeFigureOut">
               <a:rPr lang="en-NZ" smtClean="0"/>
-              <a:t>8/02/23</a:t>
+              <a:t>8/03/2023</a:t>
             </a:fld>
             <a:endParaRPr lang="en-NZ"/>
           </a:p>
@@ -2397,12 +2437,14 @@
 </file>
 
 <file path=customXml/item1.xml><?xml version="1.0" encoding="utf-8"?>
-<?mso-contentType ?>
-<FormTemplates xmlns="http://schemas.microsoft.com/sharepoint/v3/contenttype/forms">
-  <Display>DocumentLibraryForm</Display>
-  <Edit>DocumentLibraryForm</Edit>
-  <New>DocumentLibraryForm</New>
-</FormTemplates>
+<p:properties xmlns:p="http://schemas.microsoft.com/office/2006/metadata/properties" xmlns:xsi="http://www.w3.org/2001/XMLSchema-instance" xmlns:pc="http://schemas.microsoft.com/office/infopath/2007/PartnerControls">
+  <documentManagement>
+    <TaxCatchAll xmlns="7fd0e219-23b1-462b-aa0a-64a265ac969f" xsi:nil="true"/>
+    <lcf76f155ced4ddcb4097134ff3c332f xmlns="ddd648cf-ed80-40bb-b84a-3129b042ae54">
+      <Terms xmlns="http://schemas.microsoft.com/office/infopath/2007/PartnerControls"/>
+    </lcf76f155ced4ddcb4097134ff3c332f>
+  </documentManagement>
+</p:properties>
 </file>
 
 <file path=customXml/item2.xml><?xml version="1.0" encoding="utf-8"?>
@@ -2649,20 +2691,27 @@
 </file>
 
 <file path=customXml/item3.xml><?xml version="1.0" encoding="utf-8"?>
-<p:properties xmlns:p="http://schemas.microsoft.com/office/2006/metadata/properties" xmlns:xsi="http://www.w3.org/2001/XMLSchema-instance" xmlns:pc="http://schemas.microsoft.com/office/infopath/2007/PartnerControls">
-  <documentManagement>
-    <TaxCatchAll xmlns="7fd0e219-23b1-462b-aa0a-64a265ac969f" xsi:nil="true"/>
-    <lcf76f155ced4ddcb4097134ff3c332f xmlns="ddd648cf-ed80-40bb-b84a-3129b042ae54">
-      <Terms xmlns="http://schemas.microsoft.com/office/infopath/2007/PartnerControls"/>
-    </lcf76f155ced4ddcb4097134ff3c332f>
-  </documentManagement>
-</p:properties>
+<?mso-contentType ?>
+<FormTemplates xmlns="http://schemas.microsoft.com/sharepoint/v3/contenttype/forms">
+  <Display>DocumentLibraryForm</Display>
+  <Edit>DocumentLibraryForm</Edit>
+  <New>DocumentLibraryForm</New>
+</FormTemplates>
 </file>
 
 <file path=customXml/itemProps1.xml><?xml version="1.0" encoding="utf-8"?>
-<ds:datastoreItem xmlns:ds="http://schemas.openxmlformats.org/officeDocument/2006/customXml" ds:itemID="{8271116F-4DF6-4C06-839F-429691A000A1}">
+<ds:datastoreItem xmlns:ds="http://schemas.openxmlformats.org/officeDocument/2006/customXml" ds:itemID="{0D982BED-EF80-45B0-B715-7101F3153ABD}">
   <ds:schemaRefs>
-    <ds:schemaRef ds:uri="http://schemas.microsoft.com/sharepoint/v3/contenttype/forms"/>
+    <ds:schemaRef ds:uri="http://schemas.microsoft.com/office/2006/documentManagement/types"/>
+    <ds:schemaRef ds:uri="http://purl.org/dc/elements/1.1/"/>
+    <ds:schemaRef ds:uri="http://purl.org/dc/terms/"/>
+    <ds:schemaRef ds:uri="http://schemas.microsoft.com/office/2006/metadata/properties"/>
+    <ds:schemaRef ds:uri="http://schemas.microsoft.com/office/infopath/2007/PartnerControls"/>
+    <ds:schemaRef ds:uri="http://www.w3.org/XML/1998/namespace"/>
+    <ds:schemaRef ds:uri="http://schemas.openxmlformats.org/package/2006/metadata/core-properties"/>
+    <ds:schemaRef ds:uri="7fd0e219-23b1-462b-aa0a-64a265ac969f"/>
+    <ds:schemaRef ds:uri="ddd648cf-ed80-40bb-b84a-3129b042ae54"/>
+    <ds:schemaRef ds:uri="http://purl.org/dc/dcmitype/"/>
   </ds:schemaRefs>
 </ds:datastoreItem>
 </file>
@@ -2687,18 +2736,9 @@
 </file>
 
 <file path=customXml/itemProps3.xml><?xml version="1.0" encoding="utf-8"?>
-<ds:datastoreItem xmlns:ds="http://schemas.openxmlformats.org/officeDocument/2006/customXml" ds:itemID="{0D982BED-EF80-45B0-B715-7101F3153ABD}">
+<ds:datastoreItem xmlns:ds="http://schemas.openxmlformats.org/officeDocument/2006/customXml" ds:itemID="{8271116F-4DF6-4C06-839F-429691A000A1}">
   <ds:schemaRefs>
-    <ds:schemaRef ds:uri="http://schemas.microsoft.com/office/2006/documentManagement/types"/>
-    <ds:schemaRef ds:uri="http://purl.org/dc/elements/1.1/"/>
-    <ds:schemaRef ds:uri="http://purl.org/dc/terms/"/>
-    <ds:schemaRef ds:uri="http://schemas.microsoft.com/office/2006/metadata/properties"/>
-    <ds:schemaRef ds:uri="http://schemas.microsoft.com/office/infopath/2007/PartnerControls"/>
-    <ds:schemaRef ds:uri="http://www.w3.org/XML/1998/namespace"/>
-    <ds:schemaRef ds:uri="http://schemas.openxmlformats.org/package/2006/metadata/core-properties"/>
-    <ds:schemaRef ds:uri="7fd0e219-23b1-462b-aa0a-64a265ac969f"/>
-    <ds:schemaRef ds:uri="ddd648cf-ed80-40bb-b84a-3129b042ae54"/>
-    <ds:schemaRef ds:uri="http://purl.org/dc/dcmitype/"/>
+    <ds:schemaRef ds:uri="http://schemas.microsoft.com/sharepoint/v3/contenttype/forms"/>
   </ds:schemaRefs>
 </ds:datastoreItem>
 </file>
</xml_diff>